<commit_message>
update recommendation algorithms material
</commit_message>
<xml_diff>
--- a/基于材料图谱推荐.pptx
+++ b/基于材料图谱推荐.pptx
@@ -5161,7 +5161,7 @@
                 <a:latin typeface="宋体" panose="02010600030101010101" pitchFamily="2" charset="-122"/>
                 <a:ea typeface="宋体" panose="02010600030101010101" pitchFamily="2" charset="-122"/>
               </a:rPr>
-              <a:t>制备</a:t>
+              <a:t>合成</a:t>
             </a:r>
           </a:p>
         </p:txBody>
@@ -5245,7 +5245,7 @@
                 <a:latin typeface="宋体" panose="02010600030101010101" pitchFamily="2" charset="-122"/>
                 <a:ea typeface="宋体" panose="02010600030101010101" pitchFamily="2" charset="-122"/>
               </a:rPr>
-              <a:t>合成</a:t>
+              <a:t>制备</a:t>
             </a:r>
           </a:p>
         </p:txBody>
@@ -5437,7 +5437,7 @@
                 <a:latin typeface="宋体" panose="02010600030101010101" pitchFamily="2" charset="-122"/>
                 <a:ea typeface="宋体" panose="02010600030101010101" pitchFamily="2" charset="-122"/>
               </a:rPr>
-              <a:t>制备（原材料</a:t>
+              <a:t>合成（原材料</a:t>
             </a:r>
             <a:r>
               <a:rPr lang="en-US" altLang="zh-CN" dirty="0">
@@ -5451,7 +5451,7 @@
                 <a:latin typeface="宋体" panose="02010600030101010101" pitchFamily="2" charset="-122"/>
                 <a:ea typeface="宋体" panose="02010600030101010101" pitchFamily="2" charset="-122"/>
               </a:rPr>
-              <a:t>样品），合成（样品</a:t>
+              <a:t>样品），制备（样品</a:t>
             </a:r>
             <a:r>
               <a:rPr lang="en-US" altLang="zh-CN" dirty="0">
@@ -9157,7 +9157,7 @@
                 <a:latin typeface="宋体" panose="02010600030101010101" pitchFamily="2" charset="-122"/>
                 <a:ea typeface="宋体" panose="02010600030101010101" pitchFamily="2" charset="-122"/>
               </a:rPr>
-              <a:t>制备（原材料</a:t>
+              <a:t>合成（原材料</a:t>
             </a:r>
             <a:r>
               <a:rPr lang="en-US" altLang="zh-CN" dirty="0">
@@ -9171,7 +9171,7 @@
                 <a:latin typeface="宋体" panose="02010600030101010101" pitchFamily="2" charset="-122"/>
                 <a:ea typeface="宋体" panose="02010600030101010101" pitchFamily="2" charset="-122"/>
               </a:rPr>
-              <a:t>样品），合成（样品</a:t>
+              <a:t>样品），制备（样品</a:t>
             </a:r>
             <a:r>
               <a:rPr lang="en-US" altLang="zh-CN" dirty="0">
@@ -9276,10 +9276,10 @@
       </p:sp>
       <p:pic>
         <p:nvPicPr>
-          <p:cNvPr id="3" name="图片 2">
-            <a:extLst>
-              <a:ext uri="{FF2B5EF4-FFF2-40B4-BE49-F238E27FC236}">
-                <a16:creationId xmlns:a16="http://schemas.microsoft.com/office/drawing/2014/main" id="{4F07BAC3-BBA2-491C-9733-17877D185D0D}"/>
+          <p:cNvPr id="4" name="图片 3">
+            <a:extLst>
+              <a:ext uri="{FF2B5EF4-FFF2-40B4-BE49-F238E27FC236}">
+                <a16:creationId xmlns:a16="http://schemas.microsoft.com/office/drawing/2014/main" id="{D2070103-F951-4FD2-8A90-6552A88ADDF8}"/>
               </a:ext>
             </a:extLst>
           </p:cNvPr>
@@ -9302,8 +9302,8 @@
         </p:blipFill>
         <p:spPr>
           <a:xfrm>
-            <a:off x="2654300" y="1795549"/>
-            <a:ext cx="6375400" cy="2909055"/>
+            <a:off x="2805952" y="1764390"/>
+            <a:ext cx="6212485" cy="2834718"/>
           </a:xfrm>
           <a:prstGeom prst="rect">
             <a:avLst/>

</xml_diff>